<commit_message>
Reverted to version 3
</commit_message>
<xml_diff>
--- a/PowerPoint/PPTTest2.pptx
+++ b/PowerPoint/PPTTest2.pptx
@@ -373,11 +373,11 @@
         </c:dLbls>
         <c:gapWidth val="219"/>
         <c:overlap val="-27"/>
-        <c:axId val="552852040"/>
-        <c:axId val="552847728"/>
+        <c:axId val="410929944"/>
+        <c:axId val="410924848"/>
       </c:barChart>
       <c:catAx>
-        <c:axId val="552852040"/>
+        <c:axId val="410929944"/>
         <c:scaling>
           <c:orientation val="minMax"/>
         </c:scaling>
@@ -420,7 +420,7 @@
             <a:endParaRPr lang="en-US"/>
           </a:p>
         </c:txPr>
-        <c:crossAx val="552847728"/>
+        <c:crossAx val="410924848"/>
         <c:crosses val="autoZero"/>
         <c:auto val="1"/>
         <c:lblAlgn val="ctr"/>
@@ -428,7 +428,7 @@
         <c:noMultiLvlLbl val="0"/>
       </c:catAx>
       <c:valAx>
-        <c:axId val="552847728"/>
+        <c:axId val="410924848"/>
         <c:scaling>
           <c:orientation val="minMax"/>
         </c:scaling>
@@ -479,7 +479,7 @@
             <a:endParaRPr lang="en-US"/>
           </a:p>
         </c:txPr>
-        <c:crossAx val="552852040"/>
+        <c:crossAx val="410929944"/>
         <c:crosses val="autoZero"/>
         <c:crossBetween val="between"/>
       </c:valAx>
@@ -5035,8 +5035,8 @@
           <a:lstStyle/>
           <a:p>
             <a:r>
-              <a:rPr lang="en-US"/>
-              <a:t>Slide 4</a:t>
+              <a:rPr lang="en-US" dirty="0" smtClean="0"/>
+              <a:t>Slide 2</a:t>
             </a:r>
             <a:endParaRPr lang="en-US" dirty="0"/>
           </a:p>
@@ -5059,7 +5059,7 @@
           <a:p>
             <a:r>
               <a:rPr lang="en-US" dirty="0" smtClean="0"/>
-              <a:t>Table Talk</a:t>
+              <a:t>Table </a:t>
             </a:r>
             <a:endParaRPr lang="en-US" dirty="0"/>
           </a:p>
@@ -5221,8 +5221,12 @@
           <a:lstStyle/>
           <a:p>
             <a:r>
-              <a:rPr lang="en-US" dirty="0" smtClean="0"/>
-              <a:t>Graphing the future</a:t>
+              <a:rPr lang="en-US"/>
+              <a:t>G</a:t>
+            </a:r>
+            <a:r>
+              <a:rPr lang="en-US" smtClean="0"/>
+              <a:t>raph</a:t>
             </a:r>
             <a:endParaRPr lang="en-US" dirty="0"/>
           </a:p>

</xml_diff>